<commit_message>
- 001-questionnement : vois remplacéd par soundly-Brigitte et intégrée dans H5P - 006 Correction orthographe texte
</commit_message>
<xml_diff>
--- a/thématique SI/001 Système/rsrc/systeme_questionnement.pptx
+++ b/thématique SI/001 Système/rsrc/systeme_questionnement.pptx
@@ -105,6 +105,11 @@
       </a:defRPr>
     </a:lvl9pPr>
   </p:defaultTextStyle>
+  <p:extLst>
+    <p:ext uri="{EFAFB233-063F-42B5-8137-9DF3F51BA10A}">
+      <p15:sldGuideLst xmlns:p15="http://schemas.microsoft.com/office/powerpoint/2012/main"/>
+    </p:ext>
+  </p:extLst>
 </p:presentation>
 </file>
 
@@ -255,7 +260,7 @@
           <a:p>
             <a:fld id="{D2AE1510-050B-AB41-A0A8-2077F8191168}" type="datetimeFigureOut">
               <a:rPr lang="fr-FR" smtClean="0"/>
-              <a:t>27/04/2023</a:t>
+              <a:t>22/05/2023</a:t>
             </a:fld>
             <a:endParaRPr lang="fr-FR"/>
           </a:p>
@@ -453,7 +458,7 @@
           <a:p>
             <a:fld id="{D2AE1510-050B-AB41-A0A8-2077F8191168}" type="datetimeFigureOut">
               <a:rPr lang="fr-FR" smtClean="0"/>
-              <a:t>27/04/2023</a:t>
+              <a:t>22/05/2023</a:t>
             </a:fld>
             <a:endParaRPr lang="fr-FR"/>
           </a:p>
@@ -661,7 +666,7 @@
           <a:p>
             <a:fld id="{D2AE1510-050B-AB41-A0A8-2077F8191168}" type="datetimeFigureOut">
               <a:rPr lang="fr-FR" smtClean="0"/>
-              <a:t>27/04/2023</a:t>
+              <a:t>22/05/2023</a:t>
             </a:fld>
             <a:endParaRPr lang="fr-FR"/>
           </a:p>
@@ -859,7 +864,7 @@
           <a:p>
             <a:fld id="{D2AE1510-050B-AB41-A0A8-2077F8191168}" type="datetimeFigureOut">
               <a:rPr lang="fr-FR" smtClean="0"/>
-              <a:t>27/04/2023</a:t>
+              <a:t>22/05/2023</a:t>
             </a:fld>
             <a:endParaRPr lang="fr-FR"/>
           </a:p>
@@ -1134,7 +1139,7 @@
           <a:p>
             <a:fld id="{D2AE1510-050B-AB41-A0A8-2077F8191168}" type="datetimeFigureOut">
               <a:rPr lang="fr-FR" smtClean="0"/>
-              <a:t>27/04/2023</a:t>
+              <a:t>22/05/2023</a:t>
             </a:fld>
             <a:endParaRPr lang="fr-FR"/>
           </a:p>
@@ -1399,7 +1404,7 @@
           <a:p>
             <a:fld id="{D2AE1510-050B-AB41-A0A8-2077F8191168}" type="datetimeFigureOut">
               <a:rPr lang="fr-FR" smtClean="0"/>
-              <a:t>27/04/2023</a:t>
+              <a:t>22/05/2023</a:t>
             </a:fld>
             <a:endParaRPr lang="fr-FR"/>
           </a:p>
@@ -1811,7 +1816,7 @@
           <a:p>
             <a:fld id="{D2AE1510-050B-AB41-A0A8-2077F8191168}" type="datetimeFigureOut">
               <a:rPr lang="fr-FR" smtClean="0"/>
-              <a:t>27/04/2023</a:t>
+              <a:t>22/05/2023</a:t>
             </a:fld>
             <a:endParaRPr lang="fr-FR"/>
           </a:p>
@@ -1952,7 +1957,7 @@
           <a:p>
             <a:fld id="{D2AE1510-050B-AB41-A0A8-2077F8191168}" type="datetimeFigureOut">
               <a:rPr lang="fr-FR" smtClean="0"/>
-              <a:t>27/04/2023</a:t>
+              <a:t>22/05/2023</a:t>
             </a:fld>
             <a:endParaRPr lang="fr-FR"/>
           </a:p>
@@ -2065,7 +2070,7 @@
           <a:p>
             <a:fld id="{D2AE1510-050B-AB41-A0A8-2077F8191168}" type="datetimeFigureOut">
               <a:rPr lang="fr-FR" smtClean="0"/>
-              <a:t>27/04/2023</a:t>
+              <a:t>22/05/2023</a:t>
             </a:fld>
             <a:endParaRPr lang="fr-FR"/>
           </a:p>
@@ -2376,7 +2381,7 @@
           <a:p>
             <a:fld id="{D2AE1510-050B-AB41-A0A8-2077F8191168}" type="datetimeFigureOut">
               <a:rPr lang="fr-FR" smtClean="0"/>
-              <a:t>27/04/2023</a:t>
+              <a:t>22/05/2023</a:t>
             </a:fld>
             <a:endParaRPr lang="fr-FR"/>
           </a:p>
@@ -2664,7 +2669,7 @@
           <a:p>
             <a:fld id="{D2AE1510-050B-AB41-A0A8-2077F8191168}" type="datetimeFigureOut">
               <a:rPr lang="fr-FR" smtClean="0"/>
-              <a:t>27/04/2023</a:t>
+              <a:t>22/05/2023</a:t>
             </a:fld>
             <a:endParaRPr lang="fr-FR"/>
           </a:p>
@@ -2905,7 +2910,7 @@
           <a:p>
             <a:fld id="{D2AE1510-050B-AB41-A0A8-2077F8191168}" type="datetimeFigureOut">
               <a:rPr lang="fr-FR" smtClean="0"/>
-              <a:t>27/04/2023</a:t>
+              <a:t>22/05/2023</a:t>
             </a:fld>
             <a:endParaRPr lang="fr-FR"/>
           </a:p>
@@ -3620,6 +3625,292 @@
           </a:p>
         </p:txBody>
       </p:sp>
+      <p:pic>
+        <p:nvPicPr>
+          <p:cNvPr id="3" name="Soundly Voice Designer, Brigitte 14">
+            <a:hlinkClick r:id="" action="ppaction://media"/>
+            <a:extLst>
+              <a:ext uri="{FF2B5EF4-FFF2-40B4-BE49-F238E27FC236}">
+                <a16:creationId xmlns:a16="http://schemas.microsoft.com/office/drawing/2014/main" id="{14999BE9-79FA-E0E9-1A53-E0E196319165}"/>
+              </a:ext>
+            </a:extLst>
+          </p:cNvPr>
+          <p:cNvPicPr>
+            <a:picLocks noChangeAspect="1"/>
+          </p:cNvPicPr>
+          <p:nvPr>
+            <a:audioFile r:link="rId2"/>
+            <p:extLst>
+              <p:ext uri="{DAA4B4D4-6D71-4841-9C94-3DE7FCFB9230}">
+                <p14:media xmlns:p14="http://schemas.microsoft.com/office/powerpoint/2010/main" r:embed="rId1"/>
+              </p:ext>
+            </p:extLst>
+          </p:nvPr>
+        </p:nvPicPr>
+        <p:blipFill>
+          <a:blip r:embed="rId14"/>
+          <a:stretch>
+            <a:fillRect/>
+          </a:stretch>
+        </p:blipFill>
+        <p:spPr>
+          <a:xfrm>
+            <a:off x="4574365" y="-1869904"/>
+            <a:ext cx="812800" cy="812800"/>
+          </a:xfrm>
+          <a:prstGeom prst="rect">
+            <a:avLst/>
+          </a:prstGeom>
+        </p:spPr>
+      </p:pic>
+      <p:pic>
+        <p:nvPicPr>
+          <p:cNvPr id="9" name="Soundly Voice Designer, Brigitte 15">
+            <a:hlinkClick r:id="" action="ppaction://media"/>
+            <a:extLst>
+              <a:ext uri="{FF2B5EF4-FFF2-40B4-BE49-F238E27FC236}">
+                <a16:creationId xmlns:a16="http://schemas.microsoft.com/office/drawing/2014/main" id="{A372F472-797A-5DF0-FB84-F9075040C219}"/>
+              </a:ext>
+            </a:extLst>
+          </p:cNvPr>
+          <p:cNvPicPr>
+            <a:picLocks noChangeAspect="1"/>
+          </p:cNvPicPr>
+          <p:nvPr>
+            <a:audioFile r:link="rId4"/>
+            <p:extLst>
+              <p:ext uri="{DAA4B4D4-6D71-4841-9C94-3DE7FCFB9230}">
+                <p14:media xmlns:p14="http://schemas.microsoft.com/office/powerpoint/2010/main" r:embed="rId3"/>
+              </p:ext>
+            </p:extLst>
+          </p:nvPr>
+        </p:nvPicPr>
+        <p:blipFill>
+          <a:blip r:embed="rId14"/>
+          <a:stretch>
+            <a:fillRect/>
+          </a:stretch>
+        </p:blipFill>
+        <p:spPr>
+          <a:xfrm>
+            <a:off x="3006068" y="-1970093"/>
+            <a:ext cx="812800" cy="812800"/>
+          </a:xfrm>
+          <a:prstGeom prst="rect">
+            <a:avLst/>
+          </a:prstGeom>
+        </p:spPr>
+      </p:pic>
+      <p:pic>
+        <p:nvPicPr>
+          <p:cNvPr id="10" name="Soundly Voice Designer, Brigitte 16">
+            <a:hlinkClick r:id="" action="ppaction://media"/>
+            <a:extLst>
+              <a:ext uri="{FF2B5EF4-FFF2-40B4-BE49-F238E27FC236}">
+                <a16:creationId xmlns:a16="http://schemas.microsoft.com/office/drawing/2014/main" id="{76327763-5F23-4C70-BB3D-2B430C94AE56}"/>
+              </a:ext>
+            </a:extLst>
+          </p:cNvPr>
+          <p:cNvPicPr>
+            <a:picLocks noChangeAspect="1"/>
+          </p:cNvPicPr>
+          <p:nvPr>
+            <a:audioFile r:link="rId6"/>
+            <p:extLst>
+              <p:ext uri="{DAA4B4D4-6D71-4841-9C94-3DE7FCFB9230}">
+                <p14:media xmlns:p14="http://schemas.microsoft.com/office/powerpoint/2010/main" r:embed="rId5"/>
+              </p:ext>
+            </p:extLst>
+          </p:nvPr>
+        </p:nvPicPr>
+        <p:blipFill>
+          <a:blip r:embed="rId14"/>
+          <a:stretch>
+            <a:fillRect/>
+          </a:stretch>
+        </p:blipFill>
+        <p:spPr>
+          <a:xfrm>
+            <a:off x="2388185" y="-1850270"/>
+            <a:ext cx="812800" cy="812800"/>
+          </a:xfrm>
+          <a:prstGeom prst="rect">
+            <a:avLst/>
+          </a:prstGeom>
+        </p:spPr>
+      </p:pic>
+      <p:pic>
+        <p:nvPicPr>
+          <p:cNvPr id="11" name="Soundly Voice Designer, Brigitte 17">
+            <a:hlinkClick r:id="" action="ppaction://media"/>
+            <a:extLst>
+              <a:ext uri="{FF2B5EF4-FFF2-40B4-BE49-F238E27FC236}">
+                <a16:creationId xmlns:a16="http://schemas.microsoft.com/office/drawing/2014/main" id="{059DE492-E5C0-C195-1860-2948176EE8B9}"/>
+              </a:ext>
+            </a:extLst>
+          </p:cNvPr>
+          <p:cNvPicPr>
+            <a:picLocks noChangeAspect="1"/>
+          </p:cNvPicPr>
+          <p:nvPr>
+            <a:audioFile r:link="rId8"/>
+            <p:extLst>
+              <p:ext uri="{DAA4B4D4-6D71-4841-9C94-3DE7FCFB9230}">
+                <p14:media xmlns:p14="http://schemas.microsoft.com/office/powerpoint/2010/main" r:embed="rId7"/>
+              </p:ext>
+            </p:extLst>
+          </p:nvPr>
+        </p:nvPicPr>
+        <p:blipFill>
+          <a:blip r:embed="rId14"/>
+          <a:stretch>
+            <a:fillRect/>
+          </a:stretch>
+        </p:blipFill>
+        <p:spPr>
+          <a:xfrm>
+            <a:off x="1844390" y="-1991814"/>
+            <a:ext cx="812800" cy="812800"/>
+          </a:xfrm>
+          <a:prstGeom prst="rect">
+            <a:avLst/>
+          </a:prstGeom>
+        </p:spPr>
+      </p:pic>
+      <p:pic>
+        <p:nvPicPr>
+          <p:cNvPr id="12" name="Soundly Voice Designer, Brigitte 18">
+            <a:hlinkClick r:id="" action="ppaction://media"/>
+            <a:extLst>
+              <a:ext uri="{FF2B5EF4-FFF2-40B4-BE49-F238E27FC236}">
+                <a16:creationId xmlns:a16="http://schemas.microsoft.com/office/drawing/2014/main" id="{74F6BB37-F256-B2BA-B866-198928E19B94}"/>
+              </a:ext>
+            </a:extLst>
+          </p:cNvPr>
+          <p:cNvPicPr>
+            <a:picLocks noChangeAspect="1"/>
+          </p:cNvPicPr>
+          <p:nvPr>
+            <a:audioFile r:link="rId10"/>
+            <p:extLst>
+              <p:ext uri="{DAA4B4D4-6D71-4841-9C94-3DE7FCFB9230}">
+                <p14:media xmlns:p14="http://schemas.microsoft.com/office/powerpoint/2010/main" r:embed="rId9"/>
+              </p:ext>
+            </p:extLst>
+          </p:nvPr>
+        </p:nvPicPr>
+        <p:blipFill>
+          <a:blip r:embed="rId14"/>
+          <a:stretch>
+            <a:fillRect/>
+          </a:stretch>
+        </p:blipFill>
+        <p:spPr>
+          <a:xfrm>
+            <a:off x="1266721" y="-1637360"/>
+            <a:ext cx="812800" cy="812800"/>
+          </a:xfrm>
+          <a:prstGeom prst="rect">
+            <a:avLst/>
+          </a:prstGeom>
+        </p:spPr>
+      </p:pic>
+      <p:pic>
+        <p:nvPicPr>
+          <p:cNvPr id="13" name="Soundly Voice Designer, Brigitte 19">
+            <a:hlinkClick r:id="" action="ppaction://media"/>
+            <a:extLst>
+              <a:ext uri="{FF2B5EF4-FFF2-40B4-BE49-F238E27FC236}">
+                <a16:creationId xmlns:a16="http://schemas.microsoft.com/office/drawing/2014/main" id="{783E551D-2D48-9F7D-909A-F0993CDFBBC3}"/>
+              </a:ext>
+            </a:extLst>
+          </p:cNvPr>
+          <p:cNvPicPr>
+            <a:picLocks noChangeAspect="1"/>
+          </p:cNvPicPr>
+          <p:nvPr>
+            <a:audioFile r:link="rId12"/>
+            <p:extLst>
+              <p:ext uri="{DAA4B4D4-6D71-4841-9C94-3DE7FCFB9230}">
+                <p14:media xmlns:p14="http://schemas.microsoft.com/office/powerpoint/2010/main" r:embed="rId11"/>
+              </p:ext>
+            </p:extLst>
+          </p:nvPr>
+        </p:nvPicPr>
+        <p:blipFill>
+          <a:blip r:embed="rId14"/>
+          <a:stretch>
+            <a:fillRect/>
+          </a:stretch>
+        </p:blipFill>
+        <p:spPr>
+          <a:xfrm>
+            <a:off x="105043" y="-1846762"/>
+            <a:ext cx="812800" cy="812800"/>
+          </a:xfrm>
+          <a:prstGeom prst="rect">
+            <a:avLst/>
+          </a:prstGeom>
+        </p:spPr>
+      </p:pic>
+      <p:sp>
+        <p:nvSpPr>
+          <p:cNvPr id="14" name="Rectangle 13">
+            <a:extLst>
+              <a:ext uri="{FF2B5EF4-FFF2-40B4-BE49-F238E27FC236}">
+                <a16:creationId xmlns:a16="http://schemas.microsoft.com/office/drawing/2014/main" id="{F2504C94-6784-A76A-FE5F-D9D2FF93FDF4}"/>
+              </a:ext>
+            </a:extLst>
+          </p:cNvPr>
+          <p:cNvSpPr/>
+          <p:nvPr/>
+        </p:nvSpPr>
+        <p:spPr>
+          <a:xfrm>
+            <a:off x="2657190" y="1325782"/>
+            <a:ext cx="5395515" cy="1306385"/>
+          </a:xfrm>
+          <a:prstGeom prst="rect">
+            <a:avLst/>
+          </a:prstGeom>
+          <a:noFill/>
+          <a:ln>
+            <a:noFill/>
+          </a:ln>
+        </p:spPr>
+        <p:style>
+          <a:lnRef idx="2">
+            <a:schemeClr val="accent1">
+              <a:shade val="50000"/>
+            </a:schemeClr>
+          </a:lnRef>
+          <a:fillRef idx="1">
+            <a:schemeClr val="accent1"/>
+          </a:fillRef>
+          <a:effectRef idx="0">
+            <a:schemeClr val="accent1"/>
+          </a:effectRef>
+          <a:fontRef idx="minor">
+            <a:schemeClr val="lt1"/>
+          </a:fontRef>
+        </p:style>
+        <p:txBody>
+          <a:bodyPr rtlCol="0" anchor="ctr"/>
+          <a:lstStyle/>
+          <a:p>
+            <a:pPr algn="ctr"/>
+            <a:r>
+              <a:rPr lang="fr-FR" sz="3600" dirty="0">
+                <a:solidFill>
+                  <a:srgbClr val="0070C0"/>
+                </a:solidFill>
+                <a:latin typeface="Bauhaus 93" pitchFamily="82" charset="77"/>
+              </a:rPr>
+              <a:t>système solaire</a:t>
+            </a:r>
+          </a:p>
+        </p:txBody>
+      </p:sp>
     </p:spTree>
     <p:extLst>
       <p:ext uri="{BB962C8B-B14F-4D97-AF65-F5344CB8AC3E}">
@@ -3642,6 +3933,9 @@
                     <p:cTn id="3" fill="hold">
                       <p:stCondLst>
                         <p:cond delay="indefinite"/>
+                        <p:cond evt="onBegin" delay="0">
+                          <p:tn val="2"/>
+                        </p:cond>
                       </p:stCondLst>
                       <p:childTnLst>
                         <p:par>
@@ -3651,7 +3945,7 @@
                             </p:stCondLst>
                             <p:childTnLst>
                               <p:par>
-                                <p:cTn id="5" presetID="1" presetClass="entr" presetSubtype="0" fill="hold" grpId="0" nodeType="clickEffect">
+                                <p:cTn id="5" presetID="1" presetClass="entr" presetSubtype="0" fill="hold" grpId="0" nodeType="afterEffect">
                                   <p:stCondLst>
                                     <p:cond delay="0"/>
                                   </p:stCondLst>
@@ -3680,30 +3974,47 @@
                             </p:childTnLst>
                           </p:cTn>
                         </p:par>
-                      </p:childTnLst>
-                    </p:cTn>
-                  </p:par>
-                  <p:par>
-                    <p:cTn id="7" fill="hold">
-                      <p:stCondLst>
-                        <p:cond delay="indefinite"/>
-                      </p:stCondLst>
-                      <p:childTnLst>
                         <p:par>
-                          <p:cTn id="8" fill="hold">
+                          <p:cTn id="7" fill="hold">
                             <p:stCondLst>
                               <p:cond delay="0"/>
                             </p:stCondLst>
                             <p:childTnLst>
                               <p:par>
-                                <p:cTn id="9" presetID="1" presetClass="entr" presetSubtype="0" fill="hold" grpId="0" nodeType="clickEffect">
+                                <p:cTn id="8" presetID="1" presetClass="mediacall" presetSubtype="0" fill="hold" nodeType="afterEffect">
+                                  <p:stCondLst>
+                                    <p:cond delay="0"/>
+                                  </p:stCondLst>
+                                  <p:childTnLst>
+                                    <p:cmd type="call" cmd="playFrom(0.0)">
+                                      <p:cBhvr>
+                                        <p:cTn id="9" dur="1341" fill="hold"/>
+                                        <p:tgtEl>
+                                          <p:spTgt spid="11"/>
+                                        </p:tgtEl>
+                                      </p:cBhvr>
+                                    </p:cmd>
+                                  </p:childTnLst>
+                                </p:cTn>
+                              </p:par>
+                            </p:childTnLst>
+                          </p:cTn>
+                        </p:par>
+                        <p:par>
+                          <p:cTn id="10" fill="hold">
+                            <p:stCondLst>
+                              <p:cond delay="1341"/>
+                            </p:stCondLst>
+                            <p:childTnLst>
+                              <p:par>
+                                <p:cTn id="11" presetID="1" presetClass="entr" presetSubtype="0" fill="hold" grpId="0" nodeType="afterEffect">
                                   <p:stCondLst>
                                     <p:cond delay="0"/>
                                   </p:stCondLst>
                                   <p:childTnLst>
                                     <p:set>
                                       <p:cBhvr>
-                                        <p:cTn id="10" dur="1" fill="hold">
+                                        <p:cTn id="12" dur="1" fill="hold">
                                           <p:stCondLst>
                                             <p:cond delay="0"/>
                                           </p:stCondLst>
@@ -3725,68 +4036,40 @@
                             </p:childTnLst>
                           </p:cTn>
                         </p:par>
-                      </p:childTnLst>
-                    </p:cTn>
-                  </p:par>
-                  <p:par>
-                    <p:cTn id="11" fill="hold">
-                      <p:stCondLst>
-                        <p:cond delay="indefinite"/>
-                      </p:stCondLst>
-                      <p:childTnLst>
                         <p:par>
-                          <p:cTn id="12" fill="hold">
+                          <p:cTn id="13" fill="hold">
                             <p:stCondLst>
-                              <p:cond delay="0"/>
+                              <p:cond delay="1341"/>
                             </p:stCondLst>
                             <p:childTnLst>
                               <p:par>
-                                <p:cTn id="13" presetID="1" presetClass="entr" presetSubtype="0" fill="hold" grpId="0" nodeType="clickEffect">
+                                <p:cTn id="14" presetID="1" presetClass="mediacall" presetSubtype="0" fill="hold" nodeType="afterEffect">
                                   <p:stCondLst>
                                     <p:cond delay="0"/>
                                   </p:stCondLst>
                                   <p:childTnLst>
-                                    <p:set>
+                                    <p:cmd type="call" cmd="playFrom(0.0)">
                                       <p:cBhvr>
-                                        <p:cTn id="14" dur="1" fill="hold">
-                                          <p:stCondLst>
-                                            <p:cond delay="0"/>
-                                          </p:stCondLst>
-                                        </p:cTn>
+                                        <p:cTn id="15" dur="1323" fill="hold"/>
                                         <p:tgtEl>
-                                          <p:spTgt spid="4"/>
+                                          <p:spTgt spid="3"/>
                                         </p:tgtEl>
-                                        <p:attrNameLst>
-                                          <p:attrName>style.visibility</p:attrName>
-                                        </p:attrNameLst>
                                       </p:cBhvr>
-                                      <p:to>
-                                        <p:strVal val="visible"/>
-                                      </p:to>
-                                    </p:set>
+                                    </p:cmd>
                                   </p:childTnLst>
                                 </p:cTn>
                               </p:par>
                             </p:childTnLst>
                           </p:cTn>
                         </p:par>
-                      </p:childTnLst>
-                    </p:cTn>
-                  </p:par>
-                  <p:par>
-                    <p:cTn id="15" fill="hold">
-                      <p:stCondLst>
-                        <p:cond delay="indefinite"/>
-                      </p:stCondLst>
-                      <p:childTnLst>
                         <p:par>
                           <p:cTn id="16" fill="hold">
                             <p:stCondLst>
-                              <p:cond delay="0"/>
+                              <p:cond delay="2664"/>
                             </p:stCondLst>
                             <p:childTnLst>
                               <p:par>
-                                <p:cTn id="17" presetID="1" presetClass="entr" presetSubtype="0" fill="hold" grpId="0" nodeType="clickEffect">
+                                <p:cTn id="17" presetID="1" presetClass="entr" presetSubtype="0" fill="hold" grpId="0" nodeType="afterEffect">
                                   <p:stCondLst>
                                     <p:cond delay="0"/>
                                   </p:stCondLst>
@@ -3815,30 +4098,47 @@
                             </p:childTnLst>
                           </p:cTn>
                         </p:par>
-                      </p:childTnLst>
-                    </p:cTn>
-                  </p:par>
-                  <p:par>
-                    <p:cTn id="19" fill="hold">
-                      <p:stCondLst>
-                        <p:cond delay="indefinite"/>
-                      </p:stCondLst>
-                      <p:childTnLst>
                         <p:par>
-                          <p:cTn id="20" fill="hold">
+                          <p:cTn id="19" fill="hold">
                             <p:stCondLst>
-                              <p:cond delay="0"/>
+                              <p:cond delay="2664"/>
                             </p:stCondLst>
                             <p:childTnLst>
                               <p:par>
-                                <p:cTn id="21" presetID="1" presetClass="entr" presetSubtype="0" fill="hold" grpId="0" nodeType="clickEffect">
+                                <p:cTn id="20" presetID="1" presetClass="mediacall" presetSubtype="0" fill="hold" nodeType="afterEffect">
+                                  <p:stCondLst>
+                                    <p:cond delay="0"/>
+                                  </p:stCondLst>
+                                  <p:childTnLst>
+                                    <p:cmd type="call" cmd="playFrom(0.0)">
+                                      <p:cBhvr>
+                                        <p:cTn id="21" dur="1192" fill="hold"/>
+                                        <p:tgtEl>
+                                          <p:spTgt spid="9"/>
+                                        </p:tgtEl>
+                                      </p:cBhvr>
+                                    </p:cmd>
+                                  </p:childTnLst>
+                                </p:cTn>
+                              </p:par>
+                            </p:childTnLst>
+                          </p:cTn>
+                        </p:par>
+                        <p:par>
+                          <p:cTn id="22" fill="hold">
+                            <p:stCondLst>
+                              <p:cond delay="3856"/>
+                            </p:stCondLst>
+                            <p:childTnLst>
+                              <p:par>
+                                <p:cTn id="23" presetID="1" presetClass="entr" presetSubtype="0" fill="hold" grpId="0" nodeType="afterEffect">
                                   <p:stCondLst>
                                     <p:cond delay="0"/>
                                   </p:stCondLst>
                                   <p:childTnLst>
                                     <p:set>
                                       <p:cBhvr>
-                                        <p:cTn id="22" dur="1" fill="hold">
+                                        <p:cTn id="24" dur="1" fill="hold">
                                           <p:stCondLst>
                                             <p:cond delay="0"/>
                                           </p:stCondLst>
@@ -3854,6 +4154,156 @@
                                         <p:strVal val="visible"/>
                                       </p:to>
                                     </p:set>
+                                  </p:childTnLst>
+                                </p:cTn>
+                              </p:par>
+                            </p:childTnLst>
+                          </p:cTn>
+                        </p:par>
+                        <p:par>
+                          <p:cTn id="25" fill="hold">
+                            <p:stCondLst>
+                              <p:cond delay="3856"/>
+                            </p:stCondLst>
+                            <p:childTnLst>
+                              <p:par>
+                                <p:cTn id="26" presetID="1" presetClass="mediacall" presetSubtype="0" fill="hold" nodeType="afterEffect">
+                                  <p:stCondLst>
+                                    <p:cond delay="0"/>
+                                  </p:stCondLst>
+                                  <p:childTnLst>
+                                    <p:cmd type="call" cmd="playFrom(0.0)">
+                                      <p:cBhvr>
+                                        <p:cTn id="27" dur="1425" fill="hold"/>
+                                        <p:tgtEl>
+                                          <p:spTgt spid="10"/>
+                                        </p:tgtEl>
+                                      </p:cBhvr>
+                                    </p:cmd>
+                                  </p:childTnLst>
+                                </p:cTn>
+                              </p:par>
+                            </p:childTnLst>
+                          </p:cTn>
+                        </p:par>
+                        <p:par>
+                          <p:cTn id="28" fill="hold">
+                            <p:stCondLst>
+                              <p:cond delay="5281"/>
+                            </p:stCondLst>
+                            <p:childTnLst>
+                              <p:par>
+                                <p:cTn id="29" presetID="1" presetClass="entr" presetSubtype="0" fill="hold" grpId="0" nodeType="afterEffect">
+                                  <p:stCondLst>
+                                    <p:cond delay="0"/>
+                                  </p:stCondLst>
+                                  <p:childTnLst>
+                                    <p:set>
+                                      <p:cBhvr>
+                                        <p:cTn id="30" dur="1" fill="hold">
+                                          <p:stCondLst>
+                                            <p:cond delay="0"/>
+                                          </p:stCondLst>
+                                        </p:cTn>
+                                        <p:tgtEl>
+                                          <p:spTgt spid="14"/>
+                                        </p:tgtEl>
+                                        <p:attrNameLst>
+                                          <p:attrName>style.visibility</p:attrName>
+                                        </p:attrNameLst>
+                                      </p:cBhvr>
+                                      <p:to>
+                                        <p:strVal val="visible"/>
+                                      </p:to>
+                                    </p:set>
+                                  </p:childTnLst>
+                                </p:cTn>
+                              </p:par>
+                            </p:childTnLst>
+                          </p:cTn>
+                        </p:par>
+                        <p:par>
+                          <p:cTn id="31" fill="hold">
+                            <p:stCondLst>
+                              <p:cond delay="5281"/>
+                            </p:stCondLst>
+                            <p:childTnLst>
+                              <p:par>
+                                <p:cTn id="32" presetID="1" presetClass="mediacall" presetSubtype="0" fill="hold" nodeType="afterEffect">
+                                  <p:stCondLst>
+                                    <p:cond delay="0"/>
+                                  </p:stCondLst>
+                                  <p:childTnLst>
+                                    <p:cmd type="call" cmd="playFrom(0.0)">
+                                      <p:cBhvr>
+                                        <p:cTn id="33" dur="1202" fill="hold"/>
+                                        <p:tgtEl>
+                                          <p:spTgt spid="12"/>
+                                        </p:tgtEl>
+                                      </p:cBhvr>
+                                    </p:cmd>
+                                  </p:childTnLst>
+                                </p:cTn>
+                              </p:par>
+                            </p:childTnLst>
+                          </p:cTn>
+                        </p:par>
+                        <p:par>
+                          <p:cTn id="34" fill="hold">
+                            <p:stCondLst>
+                              <p:cond delay="6483"/>
+                            </p:stCondLst>
+                            <p:childTnLst>
+                              <p:par>
+                                <p:cTn id="35" presetID="1" presetClass="entr" presetSubtype="0" fill="hold" grpId="0" nodeType="afterEffect">
+                                  <p:stCondLst>
+                                    <p:cond delay="0"/>
+                                  </p:stCondLst>
+                                  <p:childTnLst>
+                                    <p:set>
+                                      <p:cBhvr>
+                                        <p:cTn id="36" dur="1" fill="hold">
+                                          <p:stCondLst>
+                                            <p:cond delay="0"/>
+                                          </p:stCondLst>
+                                        </p:cTn>
+                                        <p:tgtEl>
+                                          <p:spTgt spid="4"/>
+                                        </p:tgtEl>
+                                        <p:attrNameLst>
+                                          <p:attrName>style.visibility</p:attrName>
+                                        </p:attrNameLst>
+                                      </p:cBhvr>
+                                      <p:to>
+                                        <p:strVal val="visible"/>
+                                      </p:to>
+                                    </p:set>
+                                  </p:childTnLst>
+                                </p:cTn>
+                              </p:par>
+                            </p:childTnLst>
+                          </p:cTn>
+                        </p:par>
+                        <p:par>
+                          <p:cTn id="37" fill="hold">
+                            <p:stCondLst>
+                              <p:cond delay="6483"/>
+                            </p:stCondLst>
+                            <p:childTnLst>
+                              <p:par>
+                                <p:cTn id="38" presetID="1" presetClass="mediacall" presetSubtype="0" fill="hold" nodeType="afterEffect">
+                                  <p:stCondLst>
+                                    <p:cond delay="0"/>
+                                  </p:stCondLst>
+                                  <p:childTnLst>
+                                    <p:cmd type="call" cmd="playFrom(0.0)">
+                                      <p:cBhvr>
+                                        <p:cTn id="39" dur="1472" fill="hold"/>
+                                        <p:tgtEl>
+                                          <p:spTgt spid="13"/>
+                                        </p:tgtEl>
+                                      </p:cBhvr>
+                                    </p:cmd>
                                   </p:childTnLst>
                                 </p:cTn>
                               </p:par>
@@ -3880,6 +4330,120 @@
                 </p:cond>
               </p:nextCondLst>
             </p:seq>
+            <p:audio>
+              <p:cMediaNode vol="80000">
+                <p:cTn id="40" fill="hold" display="0">
+                  <p:stCondLst>
+                    <p:cond delay="indefinite"/>
+                  </p:stCondLst>
+                  <p:endCondLst>
+                    <p:cond evt="onStopAudio" delay="0">
+                      <p:tgtEl>
+                        <p:sldTgt/>
+                      </p:tgtEl>
+                    </p:cond>
+                  </p:endCondLst>
+                </p:cTn>
+                <p:tgtEl>
+                  <p:spTgt spid="3"/>
+                </p:tgtEl>
+              </p:cMediaNode>
+            </p:audio>
+            <p:audio>
+              <p:cMediaNode vol="80000">
+                <p:cTn id="41" fill="hold" display="0">
+                  <p:stCondLst>
+                    <p:cond delay="indefinite"/>
+                  </p:stCondLst>
+                  <p:endCondLst>
+                    <p:cond evt="onStopAudio" delay="0">
+                      <p:tgtEl>
+                        <p:sldTgt/>
+                      </p:tgtEl>
+                    </p:cond>
+                  </p:endCondLst>
+                </p:cTn>
+                <p:tgtEl>
+                  <p:spTgt spid="9"/>
+                </p:tgtEl>
+              </p:cMediaNode>
+            </p:audio>
+            <p:audio>
+              <p:cMediaNode vol="80000">
+                <p:cTn id="42" fill="hold" display="0">
+                  <p:stCondLst>
+                    <p:cond delay="indefinite"/>
+                  </p:stCondLst>
+                  <p:endCondLst>
+                    <p:cond evt="onStopAudio" delay="0">
+                      <p:tgtEl>
+                        <p:sldTgt/>
+                      </p:tgtEl>
+                    </p:cond>
+                  </p:endCondLst>
+                </p:cTn>
+                <p:tgtEl>
+                  <p:spTgt spid="10"/>
+                </p:tgtEl>
+              </p:cMediaNode>
+            </p:audio>
+            <p:audio>
+              <p:cMediaNode vol="80000">
+                <p:cTn id="43" fill="hold" display="0">
+                  <p:stCondLst>
+                    <p:cond delay="indefinite"/>
+                  </p:stCondLst>
+                  <p:endCondLst>
+                    <p:cond evt="onStopAudio" delay="0">
+                      <p:tgtEl>
+                        <p:sldTgt/>
+                      </p:tgtEl>
+                    </p:cond>
+                  </p:endCondLst>
+                </p:cTn>
+                <p:tgtEl>
+                  <p:spTgt spid="11"/>
+                </p:tgtEl>
+              </p:cMediaNode>
+            </p:audio>
+            <p:audio>
+              <p:cMediaNode vol="80000">
+                <p:cTn id="44" fill="hold" display="0">
+                  <p:stCondLst>
+                    <p:cond delay="indefinite"/>
+                  </p:stCondLst>
+                  <p:endCondLst>
+                    <p:cond evt="onStopAudio" delay="0">
+                      <p:tgtEl>
+                        <p:sldTgt/>
+                      </p:tgtEl>
+                    </p:cond>
+                  </p:endCondLst>
+                </p:cTn>
+                <p:tgtEl>
+                  <p:spTgt spid="12"/>
+                </p:tgtEl>
+              </p:cMediaNode>
+            </p:audio>
+            <p:audio>
+              <p:cMediaNode vol="80000">
+                <p:cTn id="45" fill="hold" display="0">
+                  <p:stCondLst>
+                    <p:cond delay="indefinite"/>
+                  </p:stCondLst>
+                  <p:endCondLst>
+                    <p:cond evt="onStopAudio" delay="0">
+                      <p:tgtEl>
+                        <p:sldTgt/>
+                      </p:tgtEl>
+                    </p:cond>
+                  </p:endCondLst>
+                </p:cTn>
+                <p:tgtEl>
+                  <p:spTgt spid="13"/>
+                </p:tgtEl>
+              </p:cMediaNode>
+            </p:audio>
           </p:childTnLst>
         </p:cTn>
       </p:par>
@@ -3890,6 +4454,7 @@
       <p:bldP spid="7" grpId="0"/>
       <p:bldP spid="6" grpId="0"/>
       <p:bldP spid="8" grpId="0"/>
+      <p:bldP spid="14" grpId="0"/>
     </p:bldLst>
   </p:timing>
 </p:sld>
@@ -4522,6 +5087,192 @@
           </a:p>
         </p:txBody>
       </p:sp>
+      <p:sp>
+        <p:nvSpPr>
+          <p:cNvPr id="12" name="Rectangle 11">
+            <a:extLst>
+              <a:ext uri="{FF2B5EF4-FFF2-40B4-BE49-F238E27FC236}">
+                <a16:creationId xmlns:a16="http://schemas.microsoft.com/office/drawing/2014/main" id="{701E37AB-1706-05CA-2EAF-709CA8DADE48}"/>
+              </a:ext>
+            </a:extLst>
+          </p:cNvPr>
+          <p:cNvSpPr/>
+          <p:nvPr/>
+        </p:nvSpPr>
+        <p:spPr>
+          <a:xfrm>
+            <a:off x="2657190" y="1325782"/>
+            <a:ext cx="5395515" cy="1306385"/>
+          </a:xfrm>
+          <a:prstGeom prst="rect">
+            <a:avLst/>
+          </a:prstGeom>
+          <a:noFill/>
+          <a:ln>
+            <a:noFill/>
+          </a:ln>
+        </p:spPr>
+        <p:style>
+          <a:lnRef idx="2">
+            <a:schemeClr val="accent1">
+              <a:shade val="50000"/>
+            </a:schemeClr>
+          </a:lnRef>
+          <a:fillRef idx="1">
+            <a:schemeClr val="accent1"/>
+          </a:fillRef>
+          <a:effectRef idx="0">
+            <a:schemeClr val="accent1"/>
+          </a:effectRef>
+          <a:fontRef idx="minor">
+            <a:schemeClr val="lt1"/>
+          </a:fontRef>
+        </p:style>
+        <p:txBody>
+          <a:bodyPr rtlCol="0" anchor="ctr"/>
+          <a:lstStyle/>
+          <a:p>
+            <a:pPr algn="ctr"/>
+            <a:r>
+              <a:rPr lang="fr-FR" sz="3600" dirty="0">
+                <a:solidFill>
+                  <a:srgbClr val="0070C0"/>
+                </a:solidFill>
+                <a:latin typeface="Bauhaus 93" pitchFamily="82" charset="77"/>
+              </a:rPr>
+              <a:t>système solaire</a:t>
+            </a:r>
+          </a:p>
+        </p:txBody>
+      </p:sp>
+      <p:sp>
+        <p:nvSpPr>
+          <p:cNvPr id="14" name="Rectangle 13">
+            <a:extLst>
+              <a:ext uri="{FF2B5EF4-FFF2-40B4-BE49-F238E27FC236}">
+                <a16:creationId xmlns:a16="http://schemas.microsoft.com/office/drawing/2014/main" id="{9D65689A-4635-FA7C-1028-3E9A7BC82C65}"/>
+              </a:ext>
+            </a:extLst>
+          </p:cNvPr>
+          <p:cNvSpPr/>
+          <p:nvPr/>
+        </p:nvSpPr>
+        <p:spPr>
+          <a:xfrm>
+            <a:off x="5499721" y="1503556"/>
+            <a:ext cx="4427661" cy="963827"/>
+          </a:xfrm>
+          <a:prstGeom prst="rect">
+            <a:avLst/>
+          </a:prstGeom>
+          <a:solidFill>
+            <a:schemeClr val="bg1"/>
+          </a:solidFill>
+          <a:ln>
+            <a:noFill/>
+          </a:ln>
+        </p:spPr>
+        <p:style>
+          <a:lnRef idx="2">
+            <a:schemeClr val="accent1">
+              <a:shade val="50000"/>
+            </a:schemeClr>
+          </a:lnRef>
+          <a:fillRef idx="1">
+            <a:schemeClr val="accent1"/>
+          </a:fillRef>
+          <a:effectRef idx="0">
+            <a:schemeClr val="accent1"/>
+          </a:effectRef>
+          <a:fontRef idx="minor">
+            <a:schemeClr val="lt1"/>
+          </a:fontRef>
+        </p:style>
+        <p:txBody>
+          <a:bodyPr rtlCol="0" anchor="ctr"/>
+          <a:lstStyle/>
+          <a:p>
+            <a:pPr algn="ctr"/>
+            <a:endParaRPr lang="fr-FR"/>
+          </a:p>
+        </p:txBody>
+      </p:sp>
+      <p:pic>
+        <p:nvPicPr>
+          <p:cNvPr id="16" name="Soundly Voice Designer, Brigitte 21">
+            <a:hlinkClick r:id="" action="ppaction://media"/>
+            <a:extLst>
+              <a:ext uri="{FF2B5EF4-FFF2-40B4-BE49-F238E27FC236}">
+                <a16:creationId xmlns:a16="http://schemas.microsoft.com/office/drawing/2014/main" id="{C63830AE-855A-DD3B-07EB-71E32F118995}"/>
+              </a:ext>
+            </a:extLst>
+          </p:cNvPr>
+          <p:cNvPicPr>
+            <a:picLocks noChangeAspect="1"/>
+          </p:cNvPicPr>
+          <p:nvPr>
+            <a:audioFile r:link="rId2"/>
+            <p:extLst>
+              <p:ext uri="{DAA4B4D4-6D71-4841-9C94-3DE7FCFB9230}">
+                <p14:media xmlns:p14="http://schemas.microsoft.com/office/powerpoint/2010/main" r:embed="rId1"/>
+              </p:ext>
+            </p:extLst>
+          </p:nvPr>
+        </p:nvPicPr>
+        <p:blipFill>
+          <a:blip r:embed="rId6"/>
+          <a:stretch>
+            <a:fillRect/>
+          </a:stretch>
+        </p:blipFill>
+        <p:spPr>
+          <a:xfrm>
+            <a:off x="26093" y="-1272842"/>
+            <a:ext cx="812800" cy="812800"/>
+          </a:xfrm>
+          <a:prstGeom prst="rect">
+            <a:avLst/>
+          </a:prstGeom>
+        </p:spPr>
+      </p:pic>
+      <p:pic>
+        <p:nvPicPr>
+          <p:cNvPr id="17" name="Soundly Voice Designer, Brigitte 22">
+            <a:hlinkClick r:id="" action="ppaction://media"/>
+            <a:extLst>
+              <a:ext uri="{FF2B5EF4-FFF2-40B4-BE49-F238E27FC236}">
+                <a16:creationId xmlns:a16="http://schemas.microsoft.com/office/drawing/2014/main" id="{CDBD767F-5C43-9D2C-3471-BA99DE25E9F9}"/>
+              </a:ext>
+            </a:extLst>
+          </p:cNvPr>
+          <p:cNvPicPr>
+            <a:picLocks noChangeAspect="1"/>
+          </p:cNvPicPr>
+          <p:nvPr>
+            <a:audioFile r:link="rId4"/>
+            <p:extLst>
+              <p:ext uri="{DAA4B4D4-6D71-4841-9C94-3DE7FCFB9230}">
+                <p14:media xmlns:p14="http://schemas.microsoft.com/office/powerpoint/2010/main" r:embed="rId3"/>
+              </p:ext>
+            </p:extLst>
+          </p:nvPr>
+        </p:nvPicPr>
+        <p:blipFill>
+          <a:blip r:embed="rId6"/>
+          <a:stretch>
+            <a:fillRect/>
+          </a:stretch>
+        </p:blipFill>
+        <p:spPr>
+          <a:xfrm>
+            <a:off x="2463467" y="-1346122"/>
+            <a:ext cx="812800" cy="812800"/>
+          </a:xfrm>
+          <a:prstGeom prst="rect">
+            <a:avLst/>
+          </a:prstGeom>
+        </p:spPr>
+      </p:pic>
     </p:spTree>
     <p:extLst>
       <p:ext uri="{BB962C8B-B14F-4D97-AF65-F5344CB8AC3E}">
@@ -4544,6 +5295,9 @@
                     <p:cTn id="3" fill="hold">
                       <p:stCondLst>
                         <p:cond delay="indefinite"/>
+                        <p:cond evt="onBegin" delay="0">
+                          <p:tn val="2"/>
+                        </p:cond>
                       </p:stCondLst>
                       <p:childTnLst>
                         <p:par>
@@ -4553,14 +5307,40 @@
                             </p:stCondLst>
                             <p:childTnLst>
                               <p:par>
-                                <p:cTn id="5" presetID="45" presetClass="entr" presetSubtype="0" fill="hold" grpId="0" nodeType="clickEffect">
+                                <p:cTn id="5" presetID="1" presetClass="mediacall" presetSubtype="0" fill="hold" nodeType="withEffect">
+                                  <p:stCondLst>
+                                    <p:cond delay="0"/>
+                                  </p:stCondLst>
+                                  <p:childTnLst>
+                                    <p:cmd type="call" cmd="playFrom(0.0)">
+                                      <p:cBhvr>
+                                        <p:cTn id="6" dur="2394" fill="hold"/>
+                                        <p:tgtEl>
+                                          <p:spTgt spid="16"/>
+                                        </p:tgtEl>
+                                      </p:cBhvr>
+                                    </p:cmd>
+                                  </p:childTnLst>
+                                </p:cTn>
+                              </p:par>
+                            </p:childTnLst>
+                          </p:cTn>
+                        </p:par>
+                        <p:par>
+                          <p:cTn id="7" fill="hold">
+                            <p:stCondLst>
+                              <p:cond delay="2394"/>
+                            </p:stCondLst>
+                            <p:childTnLst>
+                              <p:par>
+                                <p:cTn id="8" presetID="53" presetClass="entr" presetSubtype="16" fill="hold" grpId="0" nodeType="afterEffect">
                                   <p:stCondLst>
                                     <p:cond delay="0"/>
                                   </p:stCondLst>
                                   <p:childTnLst>
                                     <p:set>
                                       <p:cBhvr>
-                                        <p:cTn id="6" dur="1" fill="hold">
+                                        <p:cTn id="9" dur="1" fill="hold">
                                           <p:stCondLst>
                                             <p:cond delay="0"/>
                                           </p:stCondLst>
@@ -4576,17 +5356,9 @@
                                         <p:strVal val="visible"/>
                                       </p:to>
                                     </p:set>
-                                    <p:animEffect transition="in" filter="fade">
-                                      <p:cBhvr>
-                                        <p:cTn id="7" dur="1000"/>
-                                        <p:tgtEl>
-                                          <p:spTgt spid="13"/>
-                                        </p:tgtEl>
-                                      </p:cBhvr>
-                                    </p:animEffect>
                                     <p:anim calcmode="lin" valueType="num">
                                       <p:cBhvr>
-                                        <p:cTn id="8" dur="1000" fill="hold"/>
+                                        <p:cTn id="10" dur="1000" fill="hold"/>
                                         <p:tgtEl>
                                           <p:spTgt spid="13"/>
                                         </p:tgtEl>
@@ -4595,21 +5367,21 @@
                                         </p:attrNameLst>
                                       </p:cBhvr>
                                       <p:tavLst>
-                                        <p:tav tm="0" fmla="#ppt_w*sin(2.5*pi*$)">
+                                        <p:tav tm="0">
                                           <p:val>
                                             <p:fltVal val="0"/>
                                           </p:val>
                                         </p:tav>
                                         <p:tav tm="100000">
                                           <p:val>
-                                            <p:fltVal val="1"/>
+                                            <p:strVal val="#ppt_w"/>
                                           </p:val>
                                         </p:tav>
                                       </p:tavLst>
                                     </p:anim>
                                     <p:anim calcmode="lin" valueType="num">
                                       <p:cBhvr>
-                                        <p:cTn id="9" dur="1000" fill="hold"/>
+                                        <p:cTn id="11" dur="1000" fill="hold"/>
                                         <p:tgtEl>
                                           <p:spTgt spid="13"/>
                                         </p:tgtEl>
@@ -4620,7 +5392,7 @@
                                       <p:tavLst>
                                         <p:tav tm="0">
                                           <p:val>
-                                            <p:strVal val="#ppt_h"/>
+                                            <p:fltVal val="0"/>
                                           </p:val>
                                         </p:tav>
                                         <p:tav tm="100000">
@@ -4630,6 +5402,31 @@
                                         </p:tav>
                                       </p:tavLst>
                                     </p:anim>
+                                    <p:animEffect transition="in" filter="fade">
+                                      <p:cBhvr>
+                                        <p:cTn id="12" dur="1000"/>
+                                        <p:tgtEl>
+                                          <p:spTgt spid="13"/>
+                                        </p:tgtEl>
+                                      </p:cBhvr>
+                                    </p:animEffect>
+                                  </p:childTnLst>
+                                </p:cTn>
+                              </p:par>
+                              <p:par>
+                                <p:cTn id="13" presetID="1" presetClass="mediacall" presetSubtype="0" fill="hold" nodeType="withEffect">
+                                  <p:stCondLst>
+                                    <p:cond delay="0"/>
+                                  </p:stCondLst>
+                                  <p:childTnLst>
+                                    <p:cmd type="call" cmd="playFrom(0.0)">
+                                      <p:cBhvr>
+                                        <p:cTn id="14" dur="2348" fill="hold"/>
+                                        <p:tgtEl>
+                                          <p:spTgt spid="17"/>
+                                        </p:tgtEl>
+                                      </p:cBhvr>
+                                    </p:cmd>
                                   </p:childTnLst>
                                 </p:cTn>
                               </p:par>
@@ -4656,6 +5453,44 @@
                 </p:cond>
               </p:nextCondLst>
             </p:seq>
+            <p:audio>
+              <p:cMediaNode vol="80000">
+                <p:cTn id="15" fill="hold" display="0">
+                  <p:stCondLst>
+                    <p:cond delay="indefinite"/>
+                  </p:stCondLst>
+                  <p:endCondLst>
+                    <p:cond evt="onStopAudio" delay="0">
+                      <p:tgtEl>
+                        <p:sldTgt/>
+                      </p:tgtEl>
+                    </p:cond>
+                  </p:endCondLst>
+                </p:cTn>
+                <p:tgtEl>
+                  <p:spTgt spid="16"/>
+                </p:tgtEl>
+              </p:cMediaNode>
+            </p:audio>
+            <p:audio>
+              <p:cMediaNode vol="80000">
+                <p:cTn id="16" fill="hold" display="0">
+                  <p:stCondLst>
+                    <p:cond delay="indefinite"/>
+                  </p:stCondLst>
+                  <p:endCondLst>
+                    <p:cond evt="onStopAudio" delay="0">
+                      <p:tgtEl>
+                        <p:sldTgt/>
+                      </p:tgtEl>
+                    </p:cond>
+                  </p:endCondLst>
+                </p:cTn>
+                <p:tgtEl>
+                  <p:spTgt spid="17"/>
+                </p:tgtEl>
+              </p:cMediaNode>
+            </p:audio>
           </p:childTnLst>
         </p:cTn>
       </p:par>

</xml_diff>